<commit_message>
fix: ordine delle immagini nella presentazione
</commit_message>
<xml_diff>
--- a/Presentazione TSP.pptx
+++ b/Presentazione TSP.pptx
@@ -115,6 +115,11 @@
       </a:defRPr>
     </a:lvl9pPr>
   </p:defaultTextStyle>
+  <p:extLst>
+    <p:ext uri="{EFAFB233-063F-42B5-8137-9DF3F51BA10A}">
+      <p15:sldGuideLst xmlns:p15="http://schemas.microsoft.com/office/powerpoint/2012/main"/>
+    </p:ext>
+  </p:extLst>
 </p:presentation>
 </file>
 
@@ -9424,7 +9429,7 @@
           <a:p>
             <a:fld id="{BE9F004F-4059-4E51-9CC6-A36345886732}" type="datetimeFigureOut">
               <a:rPr lang="it-IT" smtClean="0"/>
-              <a:t>02/01/2025</a:t>
+              <a:t>16/01/2025</a:t>
             </a:fld>
             <a:endParaRPr lang="it-IT"/>
           </a:p>
@@ -10006,7 +10011,7 @@
           <a:p>
             <a:fld id="{90AF398D-DB97-4C69-8E9A-8A900B172F6A}" type="datetimeFigureOut">
               <a:rPr lang="it-IT" smtClean="0"/>
-              <a:t>02/01/2025</a:t>
+              <a:t>16/01/2025</a:t>
             </a:fld>
             <a:endParaRPr lang="it-IT"/>
           </a:p>
@@ -10204,7 +10209,7 @@
           <a:p>
             <a:fld id="{90AF398D-DB97-4C69-8E9A-8A900B172F6A}" type="datetimeFigureOut">
               <a:rPr lang="it-IT" smtClean="0"/>
-              <a:t>02/01/2025</a:t>
+              <a:t>16/01/2025</a:t>
             </a:fld>
             <a:endParaRPr lang="it-IT"/>
           </a:p>
@@ -10412,7 +10417,7 @@
           <a:p>
             <a:fld id="{90AF398D-DB97-4C69-8E9A-8A900B172F6A}" type="datetimeFigureOut">
               <a:rPr lang="it-IT" smtClean="0"/>
-              <a:t>02/01/2025</a:t>
+              <a:t>16/01/2025</a:t>
             </a:fld>
             <a:endParaRPr lang="it-IT"/>
           </a:p>
@@ -10610,7 +10615,7 @@
           <a:p>
             <a:fld id="{90AF398D-DB97-4C69-8E9A-8A900B172F6A}" type="datetimeFigureOut">
               <a:rPr lang="it-IT" smtClean="0"/>
-              <a:t>02/01/2025</a:t>
+              <a:t>16/01/2025</a:t>
             </a:fld>
             <a:endParaRPr lang="it-IT"/>
           </a:p>
@@ -10885,7 +10890,7 @@
           <a:p>
             <a:fld id="{90AF398D-DB97-4C69-8E9A-8A900B172F6A}" type="datetimeFigureOut">
               <a:rPr lang="it-IT" smtClean="0"/>
-              <a:t>02/01/2025</a:t>
+              <a:t>16/01/2025</a:t>
             </a:fld>
             <a:endParaRPr lang="it-IT"/>
           </a:p>
@@ -11150,7 +11155,7 @@
           <a:p>
             <a:fld id="{90AF398D-DB97-4C69-8E9A-8A900B172F6A}" type="datetimeFigureOut">
               <a:rPr lang="it-IT" smtClean="0"/>
-              <a:t>02/01/2025</a:t>
+              <a:t>16/01/2025</a:t>
             </a:fld>
             <a:endParaRPr lang="it-IT"/>
           </a:p>
@@ -11562,7 +11567,7 @@
           <a:p>
             <a:fld id="{90AF398D-DB97-4C69-8E9A-8A900B172F6A}" type="datetimeFigureOut">
               <a:rPr lang="it-IT" smtClean="0"/>
-              <a:t>02/01/2025</a:t>
+              <a:t>16/01/2025</a:t>
             </a:fld>
             <a:endParaRPr lang="it-IT"/>
           </a:p>
@@ -11703,7 +11708,7 @@
           <a:p>
             <a:fld id="{90AF398D-DB97-4C69-8E9A-8A900B172F6A}" type="datetimeFigureOut">
               <a:rPr lang="it-IT" smtClean="0"/>
-              <a:t>02/01/2025</a:t>
+              <a:t>16/01/2025</a:t>
             </a:fld>
             <a:endParaRPr lang="it-IT"/>
           </a:p>
@@ -11816,7 +11821,7 @@
           <a:p>
             <a:fld id="{90AF398D-DB97-4C69-8E9A-8A900B172F6A}" type="datetimeFigureOut">
               <a:rPr lang="it-IT" smtClean="0"/>
-              <a:t>02/01/2025</a:t>
+              <a:t>16/01/2025</a:t>
             </a:fld>
             <a:endParaRPr lang="it-IT"/>
           </a:p>
@@ -12127,7 +12132,7 @@
           <a:p>
             <a:fld id="{90AF398D-DB97-4C69-8E9A-8A900B172F6A}" type="datetimeFigureOut">
               <a:rPr lang="it-IT" smtClean="0"/>
-              <a:t>02/01/2025</a:t>
+              <a:t>16/01/2025</a:t>
             </a:fld>
             <a:endParaRPr lang="it-IT"/>
           </a:p>
@@ -12415,7 +12420,7 @@
           <a:p>
             <a:fld id="{90AF398D-DB97-4C69-8E9A-8A900B172F6A}" type="datetimeFigureOut">
               <a:rPr lang="it-IT" smtClean="0"/>
-              <a:t>02/01/2025</a:t>
+              <a:t>16/01/2025</a:t>
             </a:fld>
             <a:endParaRPr lang="it-IT"/>
           </a:p>
@@ -12656,7 +12661,7 @@
           <a:p>
             <a:fld id="{90AF398D-DB97-4C69-8E9A-8A900B172F6A}" type="datetimeFigureOut">
               <a:rPr lang="it-IT" smtClean="0"/>
-              <a:t>02/01/2025</a:t>
+              <a:t>16/01/2025</a:t>
             </a:fld>
             <a:endParaRPr lang="it-IT"/>
           </a:p>
@@ -15545,7 +15550,7 @@
         </p:blipFill>
         <p:spPr>
           <a:xfrm>
-            <a:off x="181620" y="728909"/>
+            <a:off x="0" y="3690574"/>
             <a:ext cx="5804105" cy="3167426"/>
           </a:xfrm>
           <a:prstGeom prst="rect">
@@ -15582,7 +15587,7 @@
         </p:blipFill>
         <p:spPr>
           <a:xfrm>
-            <a:off x="6197717" y="728909"/>
+            <a:off x="10084" y="728909"/>
             <a:ext cx="5797883" cy="3167426"/>
           </a:xfrm>
           <a:prstGeom prst="rect">
@@ -15617,7 +15622,7 @@
         </p:blipFill>
         <p:spPr>
           <a:xfrm>
-            <a:off x="6189159" y="3896335"/>
+            <a:off x="5978015" y="917648"/>
             <a:ext cx="5797883" cy="2789948"/>
           </a:xfrm>
           <a:prstGeom prst="rect">
@@ -15686,7 +15691,7 @@
         </p:blipFill>
         <p:spPr>
           <a:xfrm>
-            <a:off x="198738" y="3896335"/>
+            <a:off x="5960388" y="3896335"/>
             <a:ext cx="5804105" cy="2789948"/>
           </a:xfrm>
           <a:prstGeom prst="rect">
@@ -17650,6 +17655,23 @@
 </file>
 
 <file path=customXml/item1.xml><?xml version="1.0" encoding="utf-8"?>
+<p:properties xmlns:p="http://schemas.microsoft.com/office/2006/metadata/properties" xmlns:xsi="http://www.w3.org/2001/XMLSchema-instance" xmlns:pc="http://schemas.microsoft.com/office/infopath/2007/PartnerControls">
+  <documentManagement>
+    <_activity xmlns="46b1317a-1e67-4aca-ad36-d66afeee842a" xsi:nil="true"/>
+  </documentManagement>
+</p:properties>
+</file>
+
+<file path=customXml/item2.xml><?xml version="1.0" encoding="utf-8"?>
+<?mso-contentType ?>
+<FormTemplates xmlns="http://schemas.microsoft.com/sharepoint/v3/contenttype/forms">
+  <Display>DocumentLibraryForm</Display>
+  <Edit>DocumentLibraryForm</Edit>
+  <New>DocumentLibraryForm</New>
+</FormTemplates>
+</file>
+
+<file path=customXml/item3.xml><?xml version="1.0" encoding="utf-8"?>
 <ct:contentTypeSchema xmlns:ct="http://schemas.microsoft.com/office/2006/metadata/contentType" xmlns:ma="http://schemas.microsoft.com/office/2006/metadata/properties/metaAttributes" ct:_="" ma:_="" ma:contentTypeName="Documento" ma:contentTypeID="0x010100421E46F9317A5D47A6CA37BF0C4AC42D" ma:contentTypeVersion="11" ma:contentTypeDescription="Creare un nuovo documento." ma:contentTypeScope="" ma:versionID="0b4118545da6da77c25501cd717aa08e">
   <xsd:schema xmlns:xsd="http://www.w3.org/2001/XMLSchema" xmlns:xs="http://www.w3.org/2001/XMLSchema" xmlns:p="http://schemas.microsoft.com/office/2006/metadata/properties" xmlns:ns3="46b1317a-1e67-4aca-ad36-d66afeee842a" xmlns:ns4="64eb5e27-d1f1-443b-9612-666648a881d2" targetNamespace="http://schemas.microsoft.com/office/2006/metadata/properties" ma:root="true" ma:fieldsID="3e6af2da2afa9f8db489188648a53756" ns3:_="" ns4:_="">
     <xsd:import namespace="46b1317a-1e67-4aca-ad36-d66afeee842a"/>
@@ -17856,24 +17878,32 @@
 </ct:contentTypeSchema>
 </file>
 
-<file path=customXml/item2.xml><?xml version="1.0" encoding="utf-8"?>
-<?mso-contentType ?>
-<FormTemplates xmlns="http://schemas.microsoft.com/sharepoint/v3/contenttype/forms">
-  <Display>DocumentLibraryForm</Display>
-  <Edit>DocumentLibraryForm</Edit>
-  <New>DocumentLibraryForm</New>
-</FormTemplates>
+<file path=customXml/itemProps1.xml><?xml version="1.0" encoding="utf-8"?>
+<ds:datastoreItem xmlns:ds="http://schemas.openxmlformats.org/officeDocument/2006/customXml" ds:itemID="{F2FFAD3E-0ACA-4472-91FC-EF6E6F268BD0}">
+  <ds:schemaRefs>
+    <ds:schemaRef ds:uri="http://schemas.openxmlformats.org/package/2006/metadata/core-properties"/>
+    <ds:schemaRef ds:uri="http://purl.org/dc/dcmitype/"/>
+    <ds:schemaRef ds:uri="http://purl.org/dc/terms/"/>
+    <ds:schemaRef ds:uri="http://www.w3.org/XML/1998/namespace"/>
+    <ds:schemaRef ds:uri="http://schemas.microsoft.com/office/2006/metadata/properties"/>
+    <ds:schemaRef ds:uri="http://purl.org/dc/elements/1.1/"/>
+    <ds:schemaRef ds:uri="http://schemas.microsoft.com/office/2006/documentManagement/types"/>
+    <ds:schemaRef ds:uri="http://schemas.microsoft.com/office/infopath/2007/PartnerControls"/>
+    <ds:schemaRef ds:uri="64eb5e27-d1f1-443b-9612-666648a881d2"/>
+    <ds:schemaRef ds:uri="46b1317a-1e67-4aca-ad36-d66afeee842a"/>
+  </ds:schemaRefs>
+</ds:datastoreItem>
 </file>
 
-<file path=customXml/item3.xml><?xml version="1.0" encoding="utf-8"?>
-<p:properties xmlns:p="http://schemas.microsoft.com/office/2006/metadata/properties" xmlns:xsi="http://www.w3.org/2001/XMLSchema-instance" xmlns:pc="http://schemas.microsoft.com/office/infopath/2007/PartnerControls">
-  <documentManagement>
-    <_activity xmlns="46b1317a-1e67-4aca-ad36-d66afeee842a" xsi:nil="true"/>
-  </documentManagement>
-</p:properties>
+<file path=customXml/itemProps2.xml><?xml version="1.0" encoding="utf-8"?>
+<ds:datastoreItem xmlns:ds="http://schemas.openxmlformats.org/officeDocument/2006/customXml" ds:itemID="{5AEB6E4C-AE60-4192-BFF6-2A7BE2490A7A}">
+  <ds:schemaRefs>
+    <ds:schemaRef ds:uri="http://schemas.microsoft.com/sharepoint/v3/contenttype/forms"/>
+  </ds:schemaRefs>
+</ds:datastoreItem>
 </file>
 
-<file path=customXml/itemProps1.xml><?xml version="1.0" encoding="utf-8"?>
+<file path=customXml/itemProps3.xml><?xml version="1.0" encoding="utf-8"?>
 <ds:datastoreItem xmlns:ds="http://schemas.openxmlformats.org/officeDocument/2006/customXml" ds:itemID="{634C89D1-1F1D-4EA1-9F61-8C9E3A23E390}">
   <ds:schemaRefs>
     <ds:schemaRef ds:uri="http://schemas.microsoft.com/office/2006/metadata/contentType"/>
@@ -17890,29 +17920,4 @@
     <ds:schemaRef ds:uri="http://schemas.microsoft.com/internal/obd"/>
   </ds:schemaRefs>
 </ds:datastoreItem>
-</file>
-
-<file path=customXml/itemProps2.xml><?xml version="1.0" encoding="utf-8"?>
-<ds:datastoreItem xmlns:ds="http://schemas.openxmlformats.org/officeDocument/2006/customXml" ds:itemID="{5AEB6E4C-AE60-4192-BFF6-2A7BE2490A7A}">
-  <ds:schemaRefs>
-    <ds:schemaRef ds:uri="http://schemas.microsoft.com/sharepoint/v3/contenttype/forms"/>
-  </ds:schemaRefs>
-</ds:datastoreItem>
-</file>
-
-<file path=customXml/itemProps3.xml><?xml version="1.0" encoding="utf-8"?>
-<ds:datastoreItem xmlns:ds="http://schemas.openxmlformats.org/officeDocument/2006/customXml" ds:itemID="{F2FFAD3E-0ACA-4472-91FC-EF6E6F268BD0}">
-  <ds:schemaRefs>
-    <ds:schemaRef ds:uri="http://schemas.openxmlformats.org/package/2006/metadata/core-properties"/>
-    <ds:schemaRef ds:uri="http://purl.org/dc/dcmitype/"/>
-    <ds:schemaRef ds:uri="http://purl.org/dc/terms/"/>
-    <ds:schemaRef ds:uri="http://www.w3.org/XML/1998/namespace"/>
-    <ds:schemaRef ds:uri="http://schemas.microsoft.com/office/2006/metadata/properties"/>
-    <ds:schemaRef ds:uri="http://purl.org/dc/elements/1.1/"/>
-    <ds:schemaRef ds:uri="http://schemas.microsoft.com/office/2006/documentManagement/types"/>
-    <ds:schemaRef ds:uri="http://schemas.microsoft.com/office/infopath/2007/PartnerControls"/>
-    <ds:schemaRef ds:uri="64eb5e27-d1f1-443b-9612-666648a881d2"/>
-    <ds:schemaRef ds:uri="46b1317a-1e67-4aca-ad36-d66afeee842a"/>
-  </ds:schemaRefs>
-</ds:datastoreItem>
 </file>
</xml_diff>